<commit_message>
update ddp puzzle cube
</commit_message>
<xml_diff>
--- a/High School/Design and Drawing for Production/Unit 10 - Puzzle Cube Design Challenge/Section 1 - The Puzzle Cube Design Challenge/Assets/Unit10S1 - Puzzle Cube Design Challenge.pptx
+++ b/High School/Design and Drawing for Production/Unit 10 - Puzzle Cube Design Challenge/Section 1 - The Puzzle Cube Design Challenge/Assets/Unit10S1 - Puzzle Cube Design Challenge.pptx
@@ -222,7 +222,7 @@
           <a:p>
             <a:fld id="{6AC4FB8F-ED15-48AB-97BD-17129D4E699D}" type="datetimeFigureOut">
               <a:rPr lang="en-US" smtClean="0"/>
-              <a:t>1/28/19</a:t>
+              <a:t>1/30/19</a:t>
             </a:fld>
             <a:endParaRPr lang="en-US" dirty="0"/>
           </a:p>
@@ -387,7 +387,7 @@
           <a:p>
             <a:fld id="{BBC9D437-CD83-4825-AD0D-5E7B341BC79B}" type="datetimeFigureOut">
               <a:rPr lang="en-US" smtClean="0"/>
-              <a:t>1/28/19</a:t>
+              <a:t>1/30/19</a:t>
             </a:fld>
             <a:endParaRPr lang="en-US" dirty="0"/>
           </a:p>
@@ -813,7 +813,7 @@
           <a:p>
             <a:fld id="{85AB7CBB-843F-464A-A764-71D6ADC27CFA}" type="datetime1">
               <a:rPr lang="en-US" smtClean="0"/>
-              <a:t>1/28/19</a:t>
+              <a:t>1/30/19</a:t>
             </a:fld>
             <a:endParaRPr lang="en-US" dirty="0"/>
           </a:p>
@@ -998,7 +998,7 @@
           <a:p>
             <a:fld id="{CBEFC03D-3A1F-4813-9337-02411FCC3A9A}" type="datetime1">
               <a:rPr lang="en-US" smtClean="0"/>
-              <a:t>1/28/19</a:t>
+              <a:t>1/30/19</a:t>
             </a:fld>
             <a:endParaRPr lang="en-US" dirty="0"/>
           </a:p>
@@ -1196,7 +1196,7 @@
           <a:p>
             <a:fld id="{3D638F79-DFA0-4C26-9553-23A017B69AB6}" type="datetime1">
               <a:rPr lang="en-US" smtClean="0"/>
-              <a:t>1/28/19</a:t>
+              <a:t>1/30/19</a:t>
             </a:fld>
             <a:endParaRPr lang="en-US" dirty="0"/>
           </a:p>
@@ -1390,7 +1390,7 @@
           <a:p>
             <a:fld id="{A70B34E7-E1D9-4FBF-A1A0-4009669A00BF}" type="datetime1">
               <a:rPr lang="en-US" smtClean="0"/>
-              <a:t>1/28/19</a:t>
+              <a:t>1/30/19</a:t>
             </a:fld>
             <a:endParaRPr lang="en-US" dirty="0"/>
           </a:p>
@@ -1879,7 +1879,7 @@
           <a:p>
             <a:fld id="{7579E8B6-2F47-420B-83EA-EB2285D13EC9}" type="datetime1">
               <a:rPr lang="en-US" smtClean="0"/>
-              <a:t>1/28/19</a:t>
+              <a:t>1/30/19</a:t>
             </a:fld>
             <a:endParaRPr lang="en-US" dirty="0"/>
           </a:p>
@@ -2317,7 +2317,7 @@
           <a:p>
             <a:fld id="{2304803D-B10E-4B90-8456-A0E05393E233}" type="datetime1">
               <a:rPr lang="en-US" smtClean="0"/>
-              <a:t>1/28/19</a:t>
+              <a:t>1/30/19</a:t>
             </a:fld>
             <a:endParaRPr lang="en-US" dirty="0"/>
           </a:p>
@@ -2450,7 +2450,7 @@
           <a:p>
             <a:fld id="{CCE1E62F-6CCE-4064-96C2-2084AF883904}" type="datetime1">
               <a:rPr lang="en-US" smtClean="0"/>
-              <a:t>1/28/19</a:t>
+              <a:t>1/30/19</a:t>
             </a:fld>
             <a:endParaRPr lang="en-US" dirty="0"/>
           </a:p>
@@ -2560,7 +2560,7 @@
           <a:p>
             <a:fld id="{AA615CA6-EC4D-4728-8AA6-534BE7E9B67C}" type="datetime1">
               <a:rPr lang="en-US" smtClean="0"/>
-              <a:t>1/28/19</a:t>
+              <a:t>1/30/19</a:t>
             </a:fld>
             <a:endParaRPr lang="en-US" dirty="0"/>
           </a:p>
@@ -2874,7 +2874,7 @@
           <a:p>
             <a:fld id="{A6139942-0A2E-443A-842F-D6DE74360370}" type="datetime1">
               <a:rPr lang="en-US" smtClean="0"/>
-              <a:t>1/28/19</a:t>
+              <a:t>1/30/19</a:t>
             </a:fld>
             <a:endParaRPr lang="en-US" dirty="0"/>
           </a:p>
@@ -3391,7 +3391,7 @@
           <a:p>
             <a:fld id="{3F138946-C5C1-4A11-BA69-F12F43F8A94B}" type="datetime1">
               <a:rPr lang="en-US" smtClean="0"/>
-              <a:t>1/28/19</a:t>
+              <a:t>1/30/19</a:t>
             </a:fld>
             <a:endParaRPr lang="en-US" dirty="0"/>
           </a:p>
@@ -5103,15 +5103,9 @@
         <p:spPr/>
         <p:txBody>
           <a:bodyPr>
-            <a:normAutofit fontScale="92500" lnSpcReduction="20000"/>
+            <a:normAutofit fontScale="92500" lnSpcReduction="10000"/>
           </a:bodyPr>
           <a:lstStyle/>
-          <a:p>
-            <a:pPr marL="0" indent="0">
-              <a:buNone/>
-            </a:pPr>
-            <a:endParaRPr lang="en-US" dirty="0"/>
-          </a:p>
           <a:p>
             <a:r>
               <a:rPr lang="en-US" dirty="0"/>
@@ -5120,13 +5114,13 @@
           </a:p>
           <a:p>
             <a:r>
-              <a:rPr lang="en-US" dirty="0"/>
+              <a:rPr lang="en-US" b="1" dirty="0"/>
               <a:t>5 parts</a:t>
             </a:r>
           </a:p>
           <a:p>
             <a:r>
-              <a:rPr lang="en-US" dirty="0"/>
+              <a:rPr lang="en-US" b="1" dirty="0"/>
               <a:t>No repeated shapes</a:t>
             </a:r>
           </a:p>
@@ -5148,13 +5142,18 @@
               <a:t>Submit digital file to the classroom assignment from </a:t>
             </a:r>
             <a:r>
-              <a:rPr lang="en-US" dirty="0" err="1"/>
+              <a:rPr lang="en-US" b="1" dirty="0" err="1"/>
               <a:t>TinkerCAD</a:t>
             </a:r>
             <a:r>
-              <a:rPr lang="en-US" dirty="0"/>
-              <a:t> or SketchUp</a:t>
-            </a:r>
+              <a:rPr lang="en-US" b="1" dirty="0"/>
+              <a:t> or SketchUp </a:t>
+            </a:r>
+            <a:r>
+              <a:rPr lang="en-US" b="1"/>
+              <a:t>or mechanical drawings</a:t>
+            </a:r>
+            <a:endParaRPr lang="en-US" b="1" dirty="0"/>
           </a:p>
           <a:p>
             <a:r>

</xml_diff>